<commit_message>
HP updated code portfolio solution
</commit_message>
<xml_diff>
--- a/Week_9_Consolidation_2_and_readability/Seminar_5_style/seminar_style.pptx
+++ b/Week_9_Consolidation_2_and_readability/Seminar_5_style/seminar_style.pptx
@@ -137,10 +137,122 @@
 <file path=ppt/revisionInfo.xml><?xml version="1.0" encoding="utf-8"?>
 <p1510:revInfo xmlns:a="http://schemas.openxmlformats.org/drawingml/2006/main" xmlns:r="http://schemas.openxmlformats.org/officeDocument/2006/relationships" xmlns:p1510="http://schemas.microsoft.com/office/powerpoint/2015/10/main">
   <p1510:revLst>
-    <p1510:client id="{61AFCCFD-02DE-2908-9838-2ED3EC77D341}" v="1560" dt="2025-11-13T11:46:14.488"/>
-    <p1510:client id="{819CC9D1-2BB2-144B-9787-4378E355C3C1}" v="1" dt="2025-11-12T16:58:38.528"/>
+    <p1510:client id="{8A08FE9A-02DB-1143-B776-77506D675ED5}" v="3" dt="2025-11-19T20:24:39.713"/>
   </p1510:revLst>
 </p1510:revInfo>
+</file>
+
+<file path=ppt/changesInfos/changesInfo1.xml><?xml version="1.0" encoding="utf-8"?>
+<pc:chgInfo xmlns:a="http://schemas.openxmlformats.org/drawingml/2006/main" xmlns:r="http://schemas.openxmlformats.org/officeDocument/2006/relationships" xmlns:ac="http://schemas.microsoft.com/office/drawing/2013/main/command" xmlns:pc="http://schemas.microsoft.com/office/powerpoint/2013/main/command">
+  <pc:docChgLst>
+    <pc:chgData name="Hemma Philamore" userId="db50e2f3-17b2-4cc0-b719-fb6254d3e9df" providerId="ADAL" clId="{B5D85944-D90A-5912-90C6-4C26E424D3D6}"/>
+    <pc:docChg chg="undo custSel modSld">
+      <pc:chgData name="Hemma Philamore" userId="db50e2f3-17b2-4cc0-b719-fb6254d3e9df" providerId="ADAL" clId="{B5D85944-D90A-5912-90C6-4C26E424D3D6}" dt="2025-11-19T20:25:52.686" v="29" actId="404"/>
+      <pc:docMkLst>
+        <pc:docMk/>
+      </pc:docMkLst>
+      <pc:sldChg chg="modSp mod">
+        <pc:chgData name="Hemma Philamore" userId="db50e2f3-17b2-4cc0-b719-fb6254d3e9df" providerId="ADAL" clId="{B5D85944-D90A-5912-90C6-4C26E424D3D6}" dt="2025-11-19T20:16:25.660" v="1" actId="14100"/>
+        <pc:sldMkLst>
+          <pc:docMk/>
+          <pc:sldMk cId="602239870" sldId="290"/>
+        </pc:sldMkLst>
+        <pc:spChg chg="mod">
+          <ac:chgData name="Hemma Philamore" userId="db50e2f3-17b2-4cc0-b719-fb6254d3e9df" providerId="ADAL" clId="{B5D85944-D90A-5912-90C6-4C26E424D3D6}" dt="2025-11-19T20:16:25.660" v="1" actId="14100"/>
+          <ac:spMkLst>
+            <pc:docMk/>
+            <pc:sldMk cId="602239870" sldId="290"/>
+            <ac:spMk id="3" creationId="{3B8E4A9A-F491-5975-629A-270D6428E018}"/>
+          </ac:spMkLst>
+        </pc:spChg>
+      </pc:sldChg>
+      <pc:sldChg chg="modSp mod">
+        <pc:chgData name="Hemma Philamore" userId="db50e2f3-17b2-4cc0-b719-fb6254d3e9df" providerId="ADAL" clId="{B5D85944-D90A-5912-90C6-4C26E424D3D6}" dt="2025-11-19T20:23:06.432" v="10" actId="20577"/>
+        <pc:sldMkLst>
+          <pc:docMk/>
+          <pc:sldMk cId="1868874888" sldId="298"/>
+        </pc:sldMkLst>
+        <pc:spChg chg="mod">
+          <ac:chgData name="Hemma Philamore" userId="db50e2f3-17b2-4cc0-b719-fb6254d3e9df" providerId="ADAL" clId="{B5D85944-D90A-5912-90C6-4C26E424D3D6}" dt="2025-11-19T20:23:06.432" v="10" actId="20577"/>
+          <ac:spMkLst>
+            <pc:docMk/>
+            <pc:sldMk cId="1868874888" sldId="298"/>
+            <ac:spMk id="3" creationId="{D7EDD503-792D-D108-1E62-DDEBB517F4D0}"/>
+          </ac:spMkLst>
+        </pc:spChg>
+      </pc:sldChg>
+      <pc:sldChg chg="addSp delSp modSp mod">
+        <pc:chgData name="Hemma Philamore" userId="db50e2f3-17b2-4cc0-b719-fb6254d3e9df" providerId="ADAL" clId="{B5D85944-D90A-5912-90C6-4C26E424D3D6}" dt="2025-11-19T20:24:47.747" v="20" actId="1076"/>
+        <pc:sldMkLst>
+          <pc:docMk/>
+          <pc:sldMk cId="1031749785" sldId="302"/>
+        </pc:sldMkLst>
+        <pc:spChg chg="mod">
+          <ac:chgData name="Hemma Philamore" userId="db50e2f3-17b2-4cc0-b719-fb6254d3e9df" providerId="ADAL" clId="{B5D85944-D90A-5912-90C6-4C26E424D3D6}" dt="2025-11-19T20:24:47.747" v="20" actId="1076"/>
+          <ac:spMkLst>
+            <pc:docMk/>
+            <pc:sldMk cId="1031749785" sldId="302"/>
+            <ac:spMk id="12" creationId="{84E6CDDA-3098-B803-B3F6-2D25ACCB74FE}"/>
+          </ac:spMkLst>
+        </pc:spChg>
+        <pc:picChg chg="add del mod">
+          <ac:chgData name="Hemma Philamore" userId="db50e2f3-17b2-4cc0-b719-fb6254d3e9df" providerId="ADAL" clId="{B5D85944-D90A-5912-90C6-4C26E424D3D6}" dt="2025-11-19T20:24:23.502" v="11" actId="478"/>
+          <ac:picMkLst>
+            <pc:docMk/>
+            <pc:sldMk cId="1031749785" sldId="302"/>
+            <ac:picMk id="2" creationId="{01E969B2-DE18-6855-6C6D-7657A3A5EBBD}"/>
+          </ac:picMkLst>
+        </pc:picChg>
+        <pc:picChg chg="add mod">
+          <ac:chgData name="Hemma Philamore" userId="db50e2f3-17b2-4cc0-b719-fb6254d3e9df" providerId="ADAL" clId="{B5D85944-D90A-5912-90C6-4C26E424D3D6}" dt="2025-11-19T20:24:39.712" v="19" actId="167"/>
+          <ac:picMkLst>
+            <pc:docMk/>
+            <pc:sldMk cId="1031749785" sldId="302"/>
+            <ac:picMk id="5" creationId="{C5EE1637-ADF5-DB47-0E14-DD500F5EC4D3}"/>
+          </ac:picMkLst>
+        </pc:picChg>
+        <pc:picChg chg="del">
+          <ac:chgData name="Hemma Philamore" userId="db50e2f3-17b2-4cc0-b719-fb6254d3e9df" providerId="ADAL" clId="{B5D85944-D90A-5912-90C6-4C26E424D3D6}" dt="2025-11-19T20:24:24.470" v="12" actId="478"/>
+          <ac:picMkLst>
+            <pc:docMk/>
+            <pc:sldMk cId="1031749785" sldId="302"/>
+            <ac:picMk id="7" creationId="{AA2E0E77-C26A-3E11-2E66-2B286701BFC2}"/>
+          </ac:picMkLst>
+        </pc:picChg>
+      </pc:sldChg>
+      <pc:sldChg chg="addSp modSp mod">
+        <pc:chgData name="Hemma Philamore" userId="db50e2f3-17b2-4cc0-b719-fb6254d3e9df" providerId="ADAL" clId="{B5D85944-D90A-5912-90C6-4C26E424D3D6}" dt="2025-11-19T20:25:52.686" v="29" actId="404"/>
+        <pc:sldMkLst>
+          <pc:docMk/>
+          <pc:sldMk cId="3262772108" sldId="303"/>
+        </pc:sldMkLst>
+        <pc:spChg chg="add mod">
+          <ac:chgData name="Hemma Philamore" userId="db50e2f3-17b2-4cc0-b719-fb6254d3e9df" providerId="ADAL" clId="{B5D85944-D90A-5912-90C6-4C26E424D3D6}" dt="2025-11-19T20:25:52.686" v="29" actId="404"/>
+          <ac:spMkLst>
+            <pc:docMk/>
+            <pc:sldMk cId="3262772108" sldId="303"/>
+            <ac:spMk id="4" creationId="{F5AC9797-7533-FF05-2B4C-3DBD18885B6A}"/>
+          </ac:spMkLst>
+        </pc:spChg>
+      </pc:sldChg>
+      <pc:sldChg chg="modSp mod">
+        <pc:chgData name="Hemma Philamore" userId="db50e2f3-17b2-4cc0-b719-fb6254d3e9df" providerId="ADAL" clId="{B5D85944-D90A-5912-90C6-4C26E424D3D6}" dt="2025-11-19T20:25:30.165" v="21" actId="21"/>
+        <pc:sldMkLst>
+          <pc:docMk/>
+          <pc:sldMk cId="3819177552" sldId="306"/>
+        </pc:sldMkLst>
+        <pc:spChg chg="mod">
+          <ac:chgData name="Hemma Philamore" userId="db50e2f3-17b2-4cc0-b719-fb6254d3e9df" providerId="ADAL" clId="{B5D85944-D90A-5912-90C6-4C26E424D3D6}" dt="2025-11-19T20:25:30.165" v="21" actId="21"/>
+          <ac:spMkLst>
+            <pc:docMk/>
+            <pc:sldMk cId="3819177552" sldId="306"/>
+            <ac:spMk id="17" creationId="{02ED67BC-68C1-E070-9946-B1A8EF421C36}"/>
+          </ac:spMkLst>
+        </pc:spChg>
+      </pc:sldChg>
+    </pc:docChg>
+  </pc:docChgLst>
+</pc:chgInfo>
 </file>
 
 <file path=ppt/slideLayouts/slideLayout1.xml><?xml version="1.0" encoding="utf-8"?>
@@ -292,7 +404,7 @@
           <a:p>
             <a:fld id="{4C41FE8A-7D63-1141-8CB6-F8DD8B593433}" type="datetimeFigureOut">
               <a:rPr lang="en-US" smtClean="0"/>
-              <a:t>11/13/2025</a:t>
+              <a:t>11/19/25</a:t>
             </a:fld>
             <a:endParaRPr lang="en-US"/>
           </a:p>
@@ -492,7 +604,7 @@
           <a:p>
             <a:fld id="{4C41FE8A-7D63-1141-8CB6-F8DD8B593433}" type="datetimeFigureOut">
               <a:rPr lang="en-US" smtClean="0"/>
-              <a:t>11/13/2025</a:t>
+              <a:t>11/19/25</a:t>
             </a:fld>
             <a:endParaRPr lang="en-US"/>
           </a:p>
@@ -702,7 +814,7 @@
           <a:p>
             <a:fld id="{4C41FE8A-7D63-1141-8CB6-F8DD8B593433}" type="datetimeFigureOut">
               <a:rPr lang="en-US" smtClean="0"/>
-              <a:t>11/13/2025</a:t>
+              <a:t>11/19/25</a:t>
             </a:fld>
             <a:endParaRPr lang="en-US"/>
           </a:p>
@@ -902,7 +1014,7 @@
           <a:p>
             <a:fld id="{4C41FE8A-7D63-1141-8CB6-F8DD8B593433}" type="datetimeFigureOut">
               <a:rPr lang="en-US" smtClean="0"/>
-              <a:t>11/13/2025</a:t>
+              <a:t>11/19/25</a:t>
             </a:fld>
             <a:endParaRPr lang="en-US"/>
           </a:p>
@@ -1178,7 +1290,7 @@
           <a:p>
             <a:fld id="{4C41FE8A-7D63-1141-8CB6-F8DD8B593433}" type="datetimeFigureOut">
               <a:rPr lang="en-US" smtClean="0"/>
-              <a:t>11/13/2025</a:t>
+              <a:t>11/19/25</a:t>
             </a:fld>
             <a:endParaRPr lang="en-US"/>
           </a:p>
@@ -1446,7 +1558,7 @@
           <a:p>
             <a:fld id="{4C41FE8A-7D63-1141-8CB6-F8DD8B593433}" type="datetimeFigureOut">
               <a:rPr lang="en-US" smtClean="0"/>
-              <a:t>11/13/2025</a:t>
+              <a:t>11/19/25</a:t>
             </a:fld>
             <a:endParaRPr lang="en-US"/>
           </a:p>
@@ -1861,7 +1973,7 @@
           <a:p>
             <a:fld id="{4C41FE8A-7D63-1141-8CB6-F8DD8B593433}" type="datetimeFigureOut">
               <a:rPr lang="en-US" smtClean="0"/>
-              <a:t>11/13/2025</a:t>
+              <a:t>11/19/25</a:t>
             </a:fld>
             <a:endParaRPr lang="en-US"/>
           </a:p>
@@ -2003,7 +2115,7 @@
           <a:p>
             <a:fld id="{4C41FE8A-7D63-1141-8CB6-F8DD8B593433}" type="datetimeFigureOut">
               <a:rPr lang="en-US" smtClean="0"/>
-              <a:t>11/13/2025</a:t>
+              <a:t>11/19/25</a:t>
             </a:fld>
             <a:endParaRPr lang="en-US"/>
           </a:p>
@@ -2116,7 +2228,7 @@
           <a:p>
             <a:fld id="{4C41FE8A-7D63-1141-8CB6-F8DD8B593433}" type="datetimeFigureOut">
               <a:rPr lang="en-US" smtClean="0"/>
-              <a:t>11/13/2025</a:t>
+              <a:t>11/19/25</a:t>
             </a:fld>
             <a:endParaRPr lang="en-US"/>
           </a:p>
@@ -2429,7 +2541,7 @@
           <a:p>
             <a:fld id="{4C41FE8A-7D63-1141-8CB6-F8DD8B593433}" type="datetimeFigureOut">
               <a:rPr lang="en-US" smtClean="0"/>
-              <a:t>11/13/2025</a:t>
+              <a:t>11/19/25</a:t>
             </a:fld>
             <a:endParaRPr lang="en-US"/>
           </a:p>
@@ -2718,7 +2830,7 @@
           <a:p>
             <a:fld id="{4C41FE8A-7D63-1141-8CB6-F8DD8B593433}" type="datetimeFigureOut">
               <a:rPr lang="en-US" smtClean="0"/>
-              <a:t>11/13/2025</a:t>
+              <a:t>11/19/25</a:t>
             </a:fld>
             <a:endParaRPr lang="en-US"/>
           </a:p>
@@ -2961,7 +3073,7 @@
           <a:p>
             <a:fld id="{4C41FE8A-7D63-1141-8CB6-F8DD8B593433}" type="datetimeFigureOut">
               <a:rPr lang="en-US" smtClean="0"/>
-              <a:t>11/13/2025</a:t>
+              <a:t>11/19/25</a:t>
             </a:fld>
             <a:endParaRPr lang="en-US"/>
           </a:p>
@@ -5269,10 +5381,10 @@
       </p:grpSpPr>
       <p:pic>
         <p:nvPicPr>
-          <p:cNvPr id="7" name="Picture 6">
-            <a:extLst>
-              <a:ext uri="{FF2B5EF4-FFF2-40B4-BE49-F238E27FC236}">
-                <a16:creationId xmlns:a16="http://schemas.microsoft.com/office/drawing/2014/main" id="{AA2E0E77-C26A-3E11-2E66-2B286701BFC2}"/>
+          <p:cNvPr id="5" name="Picture 4">
+            <a:extLst>
+              <a:ext uri="{FF2B5EF4-FFF2-40B4-BE49-F238E27FC236}">
+                <a16:creationId xmlns:a16="http://schemas.microsoft.com/office/drawing/2014/main" id="{C5EE1637-ADF5-DB47-0E14-DD500F5EC4D3}"/>
               </a:ext>
             </a:extLst>
           </p:cNvPr>
@@ -5289,19 +5401,12 @@
         </p:blipFill>
         <p:spPr>
           <a:xfrm>
-            <a:off x="5295513" y="536509"/>
-            <a:ext cx="6569524" cy="5784981"/>
+            <a:off x="4955916" y="629326"/>
+            <a:ext cx="6793591" cy="4958988"/>
           </a:xfrm>
           <a:prstGeom prst="rect">
             <a:avLst/>
           </a:prstGeom>
-          <a:effectLst>
-            <a:outerShdw blurRad="50800" dist="38100" dir="2700000">
-              <a:srgbClr val="000000">
-                <a:alpha val="40000"/>
-              </a:srgbClr>
-            </a:outerShdw>
-          </a:effectLst>
         </p:spPr>
       </p:pic>
       <p:pic>
@@ -5484,7 +5589,7 @@
         </p:nvSpPr>
         <p:spPr>
           <a:xfrm>
-            <a:off x="11137445" y="306161"/>
+            <a:off x="11061245" y="512989"/>
             <a:ext cx="925285" cy="646331"/>
           </a:xfrm>
           <a:prstGeom prst="rect">
@@ -5745,7 +5850,7 @@
           <a:p>
             <a:r>
               <a:rPr lang="en-US" sz="2000" dirty="0"/>
-              <a:t>You can also use comments to temporarily remove ("comment out") sections of code that you don’t want to delete- can be really helpful for debugging.</a:t>
+              <a:t>You can also use comments to temporarily remove ("comment out") sections of code that you don’t want to delete- this can be really helpful for debugging.</a:t>
             </a:r>
           </a:p>
           <a:p>
@@ -6403,6 +6508,45 @@
           </a:p>
         </p:txBody>
       </p:sp>
+      <p:sp>
+        <p:nvSpPr>
+          <p:cNvPr id="4" name="TextBox 3">
+            <a:extLst>
+              <a:ext uri="{FF2B5EF4-FFF2-40B4-BE49-F238E27FC236}">
+                <a16:creationId xmlns:a16="http://schemas.microsoft.com/office/drawing/2014/main" id="{F5AC9797-7533-FF05-2B4C-3DBD18885B6A}"/>
+              </a:ext>
+            </a:extLst>
+          </p:cNvPr>
+          <p:cNvSpPr txBox="1"/>
+          <p:nvPr/>
+        </p:nvSpPr>
+        <p:spPr>
+          <a:xfrm>
+            <a:off x="7334057" y="3903277"/>
+            <a:ext cx="4150371" cy="1015663"/>
+          </a:xfrm>
+          <a:prstGeom prst="rect">
+            <a:avLst/>
+          </a:prstGeom>
+          <a:noFill/>
+        </p:spPr>
+        <p:txBody>
+          <a:bodyPr wrap="square">
+            <a:spAutoFit/>
+          </a:bodyPr>
+          <a:lstStyle/>
+          <a:p>
+            <a:r>
+              <a:rPr lang="en-US" sz="2000" i="1" dirty="0">
+                <a:solidFill>
+                  <a:srgbClr val="C00000"/>
+                </a:solidFill>
+              </a:rPr>
+              <a:t>We will sometimes use 'too many' comments in our code examples to help with teaching</a:t>
+            </a:r>
+          </a:p>
+        </p:txBody>
+      </p:sp>
     </p:spTree>
     <p:extLst>
       <p:ext uri="{BB962C8B-B14F-4D97-AF65-F5344CB8AC3E}">
@@ -7286,7 +7430,7 @@
         <p:spPr>
           <a:xfrm>
             <a:off x="381000" y="3429000"/>
-            <a:ext cx="4844143" cy="3139321"/>
+            <a:ext cx="4844143" cy="2215991"/>
           </a:xfrm>
           <a:prstGeom prst="rect">
             <a:avLst/>
@@ -7349,18 +7493,8 @@
             <a:endParaRPr lang="en-US" sz="2000" i="1" dirty="0"/>
           </a:p>
           <a:p>
-            <a:r>
-              <a:rPr lang="en-US" sz="2000" i="1" dirty="0">
-                <a:solidFill>
-                  <a:srgbClr val="C00000"/>
-                </a:solidFill>
-              </a:rPr>
-              <a:t>We will sometimes use 'too many' comments in our code examples to help with teaching</a:t>
-            </a:r>
-          </a:p>
-          <a:p>
             <a:pPr algn="ctr"/>
-            <a:endParaRPr lang="en-GB"/>
+            <a:endParaRPr lang="en-GB" dirty="0"/>
           </a:p>
         </p:txBody>
       </p:sp>
@@ -9458,7 +9592,12 @@
             <p:ph idx="1"/>
           </p:nvPr>
         </p:nvSpPr>
-        <p:spPr/>
+        <p:spPr>
+          <a:xfrm>
+            <a:off x="838199" y="1825625"/>
+            <a:ext cx="10765971" cy="4351338"/>
+          </a:xfrm>
+        </p:spPr>
         <p:txBody>
           <a:bodyPr>
             <a:normAutofit fontScale="85000" lnSpcReduction="20000"/>
@@ -9499,7 +9638,15 @@
           <a:p>
             <a:r>
               <a:rPr lang="en-US" dirty="0"/>
-              <a:t>We have outlined a vastly reduced set of style directives – the CPA style guide (available on blackboard).</a:t>
+              <a:t>We have outlined a vastly reduced set of style directives – the </a:t>
+            </a:r>
+            <a:r>
+              <a:rPr lang="en-US" b="1" dirty="0"/>
+              <a:t>CPA style guide </a:t>
+            </a:r>
+            <a:r>
+              <a:rPr lang="en-US" dirty="0"/>
+              <a:t>(available on blackboard).</a:t>
             </a:r>
           </a:p>
           <a:p>

</xml_diff>